<commit_message>
BestPracticesValiation With PowerBI & Update PPTX
</commit_message>
<xml_diff>
--- a/TUGAIT 2017 dbatools/dbatools - SQL Server and PowerShell together.pptx
+++ b/TUGAIT 2017 dbatools/dbatools - SQL Server and PowerShell together.pptx
@@ -123,6 +123,10 @@
 </p:presentation>
 </file>
 
+<file path=ppt/revisionInfo.xml><?xml version="1.0" encoding="utf-8"?>
+<p1510:revInfo xmlns:a="http://schemas.openxmlformats.org/drawingml/2006/main" xmlns:r="http://schemas.openxmlformats.org/officeDocument/2006/relationships" xmlns:p1510="http://schemas.microsoft.com/office/powerpoint/2015/10/main"/>
+</file>
+
 <file path=ppt/notesMasters/notesMaster1.xml><?xml version="1.0" encoding="utf-8"?>
 <p:notesMaster xmlns:a="http://schemas.openxmlformats.org/drawingml/2006/main" xmlns:r="http://schemas.openxmlformats.org/officeDocument/2006/relationships" xmlns:p="http://schemas.openxmlformats.org/presentationml/2006/main">
   <p:cSld>
@@ -1988,7 +1992,7 @@
           </a:ln>
           <a:extLst>
             <a:ext uri="{C572A759-6A51-4108-AA02-DFA0A04FC94B}">
-              <ma14:wrappingTextBoxFlag xmlns="" xmlns:ma14="http://schemas.microsoft.com/office/mac/drawingml/2011/main" val="1"/>
+              <ma14:wrappingTextBoxFlag xmlns:ma14="http://schemas.microsoft.com/office/mac/drawingml/2011/main" xmlns="" val="1"/>
             </a:ext>
           </a:extLst>
         </p:spPr>
@@ -5239,8 +5243,8 @@
         </p:nvSpPr>
         <p:spPr>
           <a:xfrm>
-            <a:off x="4401321" y="5819955"/>
-            <a:ext cx="7683260" cy="584775"/>
+            <a:off x="4482780" y="5660424"/>
+            <a:ext cx="3415041" cy="584775"/>
           </a:xfrm>
           <a:prstGeom prst="rect">
             <a:avLst/>
@@ -6191,7 +6195,7 @@
                 <a:latin typeface="Calibri" panose="020F0502020204030204" pitchFamily="34" charset="0"/>
                 <a:cs typeface="Calibri" panose="020F0502020204030204" pitchFamily="34" charset="0"/>
               </a:rPr>
-              <a:t>PowerShell Gallery</a:t>
+              <a:t>PowerShell Gallery (PowerShell v5+)</a:t>
             </a:r>
           </a:p>
           <a:p>
@@ -7155,7 +7159,7 @@
           </a:ln>
           <a:extLst>
             <a:ext uri="{C572A759-6A51-4108-AA02-DFA0A04FC94B}">
-              <ma14:wrappingTextBoxFlag xmlns="" xmlns:ma14="http://schemas.microsoft.com/office/mac/drawingml/2011/main" val="1"/>
+              <ma14:wrappingTextBoxFlag xmlns:ma14="http://schemas.microsoft.com/office/mac/drawingml/2011/main" xmlns="" val="1"/>
             </a:ext>
           </a:extLst>
         </p:spPr>
@@ -7207,8 +7211,8 @@
         </p:nvSpPr>
         <p:spPr>
           <a:xfrm>
-            <a:off x="292467" y="847102"/>
-            <a:ext cx="4286778" cy="4801314"/>
+            <a:off x="261082" y="785428"/>
+            <a:ext cx="2415564" cy="923330"/>
           </a:xfrm>
           <a:prstGeom prst="rect">
             <a:avLst/>
@@ -7231,154 +7235,75 @@
               <a:t>Rob</a:t>
             </a:r>
           </a:p>
-          <a:p>
-            <a:endParaRPr lang="en-GB" dirty="0">
-              <a:solidFill>
-                <a:srgbClr val="012456"/>
-              </a:solidFill>
-            </a:endParaRPr>
-          </a:p>
-          <a:p>
-            <a:endParaRPr lang="en-GB" dirty="0">
-              <a:solidFill>
-                <a:srgbClr val="012456"/>
-              </a:solidFill>
-            </a:endParaRPr>
-          </a:p>
-          <a:p>
-            <a:endParaRPr lang="en-GB" dirty="0">
-              <a:solidFill>
-                <a:srgbClr val="012456"/>
-              </a:solidFill>
-            </a:endParaRPr>
-          </a:p>
-          <a:p>
-            <a:endParaRPr lang="en-GB" dirty="0">
-              <a:solidFill>
-                <a:srgbClr val="012456"/>
-              </a:solidFill>
-            </a:endParaRPr>
-          </a:p>
-          <a:p>
-            <a:endParaRPr lang="en-GB" dirty="0">
-              <a:solidFill>
-                <a:srgbClr val="012456"/>
-              </a:solidFill>
-            </a:endParaRPr>
-          </a:p>
-          <a:p>
-            <a:endParaRPr lang="en-GB" dirty="0">
-              <a:solidFill>
-                <a:srgbClr val="012456"/>
-              </a:solidFill>
-            </a:endParaRPr>
-          </a:p>
-          <a:p>
-            <a:endParaRPr lang="en-GB" dirty="0">
-              <a:solidFill>
-                <a:srgbClr val="012456"/>
-              </a:solidFill>
-            </a:endParaRPr>
-          </a:p>
-          <a:p>
-            <a:endParaRPr lang="en-GB" dirty="0">
-              <a:solidFill>
-                <a:srgbClr val="012456"/>
-              </a:solidFill>
-            </a:endParaRPr>
-          </a:p>
-          <a:p>
-            <a:endParaRPr lang="en-GB" dirty="0">
-              <a:solidFill>
-                <a:srgbClr val="012456"/>
-              </a:solidFill>
-            </a:endParaRPr>
-          </a:p>
-          <a:p>
-            <a:endParaRPr lang="en-GB" dirty="0">
-              <a:solidFill>
-                <a:srgbClr val="012456"/>
-              </a:solidFill>
-            </a:endParaRPr>
-          </a:p>
-          <a:p>
-            <a:endParaRPr lang="en-GB" dirty="0">
-              <a:solidFill>
-                <a:srgbClr val="012456"/>
-              </a:solidFill>
-            </a:endParaRPr>
-          </a:p>
-          <a:p>
-            <a:r>
-              <a:rPr lang="en-GB" dirty="0">
+        </p:txBody>
+      </p:sp>
+      <p:pic>
+        <p:nvPicPr>
+          <p:cNvPr id="4" name="Picture 3" descr="A person wearing a hat&#10;&#10;Description generated with high confidence"/>
+          <p:cNvPicPr>
+            <a:picLocks noChangeAspect="1"/>
+          </p:cNvPicPr>
+          <p:nvPr/>
+        </p:nvPicPr>
+        <p:blipFill>
+          <a:blip r:embed="rId4">
+            <a:extLst>
+              <a:ext uri="{28A0092B-C50C-407E-A947-70E740481C1C}">
+                <a14:useLocalDpi xmlns:a14="http://schemas.microsoft.com/office/drawing/2010/main" val="0"/>
+              </a:ext>
+            </a:extLst>
+          </a:blip>
+          <a:stretch>
+            <a:fillRect/>
+          </a:stretch>
+        </p:blipFill>
+        <p:spPr>
+          <a:xfrm>
+            <a:off x="1509256" y="1597494"/>
+            <a:ext cx="1585636" cy="2812027"/>
+          </a:xfrm>
+          <a:prstGeom prst="rect">
+            <a:avLst/>
+          </a:prstGeom>
+        </p:spPr>
+      </p:pic>
+      <p:sp>
+        <p:nvSpPr>
+          <p:cNvPr id="5" name="TextBox 4"/>
+          <p:cNvSpPr txBox="1"/>
+          <p:nvPr/>
+        </p:nvSpPr>
+        <p:spPr>
+          <a:xfrm>
+            <a:off x="8214288" y="789807"/>
+            <a:ext cx="3456075" cy="923330"/>
+          </a:xfrm>
+          <a:prstGeom prst="rect">
+            <a:avLst/>
+          </a:prstGeom>
+          <a:noFill/>
+        </p:spPr>
+        <p:txBody>
+          <a:bodyPr wrap="square" rtlCol="0">
+            <a:spAutoFit/>
+          </a:bodyPr>
+          <a:lstStyle/>
+          <a:p>
+            <a:r>
+              <a:rPr lang="en-GB" sz="5400" dirty="0">
                 <a:solidFill>
                   <a:srgbClr val="012456"/>
                 </a:solidFill>
+                <a:latin typeface="Harlow Solid Italic" panose="04030604020F02020D02" pitchFamily="82" charset="0"/>
               </a:rPr>
-              <a:t>sqldbawith</a:t>
-            </a:r>
-            <a:r>
-              <a:rPr lang="en-GB" dirty="0">
-                <a:solidFill>
-                  <a:srgbClr val="FF0000"/>
-                </a:solidFill>
-              </a:rPr>
-              <a:t>A</a:t>
-            </a:r>
-            <a:r>
-              <a:rPr lang="en-GB" dirty="0">
-                <a:solidFill>
-                  <a:srgbClr val="012456"/>
-                </a:solidFill>
-              </a:rPr>
-              <a:t>beard.com</a:t>
-            </a:r>
-          </a:p>
-          <a:p>
-            <a:r>
-              <a:rPr lang="en-GB" dirty="0">
-                <a:solidFill>
-                  <a:srgbClr val="012456"/>
-                </a:solidFill>
-              </a:rPr>
-              <a:t>@</a:t>
-            </a:r>
-            <a:r>
-              <a:rPr lang="en-GB" dirty="0" err="1">
-                <a:solidFill>
-                  <a:srgbClr val="012456"/>
-                </a:solidFill>
-              </a:rPr>
-              <a:t>sqldbawithbeard</a:t>
-            </a:r>
-            <a:endParaRPr lang="en-GB" dirty="0">
-              <a:solidFill>
-                <a:srgbClr val="012456"/>
-              </a:solidFill>
-            </a:endParaRPr>
-          </a:p>
-          <a:p>
-            <a:r>
-              <a:rPr lang="en-GB" u="sng" dirty="0">
-                <a:hlinkClick r:id="rId4"/>
-              </a:rPr>
-              <a:t>https://uk.linkedin.com/in/robsewellsqldba</a:t>
-            </a:r>
-            <a:r>
-              <a:rPr lang="en-GB" u="sng" dirty="0"/>
-              <a:t> </a:t>
-            </a:r>
-            <a:endParaRPr lang="en-GB" dirty="0">
-              <a:solidFill>
-                <a:srgbClr val="012456"/>
-              </a:solidFill>
-            </a:endParaRPr>
+              <a:t>Cláudio</a:t>
+            </a:r>
           </a:p>
         </p:txBody>
       </p:sp>
       <p:pic>
         <p:nvPicPr>
-          <p:cNvPr id="4" name="Picture 3" descr="A person wearing a hat&#10;&#10;Description generated with high confidence"/>
+          <p:cNvPr id="8" name="Picture 7" descr="A person wearing a uniform&#10;&#10;Description generated with high confidence"/>
           <p:cNvPicPr>
             <a:picLocks noChangeAspect="1"/>
           </p:cNvPicPr>
@@ -7398,157 +7323,8 @@
         </p:blipFill>
         <p:spPr>
           <a:xfrm>
-            <a:off x="1509256" y="1597494"/>
-            <a:ext cx="1648012" cy="2922647"/>
-          </a:xfrm>
-          <a:prstGeom prst="rect">
-            <a:avLst/>
-          </a:prstGeom>
-        </p:spPr>
-      </p:pic>
-      <p:sp>
-        <p:nvSpPr>
-          <p:cNvPr id="5" name="TextBox 4"/>
-          <p:cNvSpPr txBox="1"/>
-          <p:nvPr/>
-        </p:nvSpPr>
-        <p:spPr>
-          <a:xfrm>
-            <a:off x="7953555" y="847102"/>
-            <a:ext cx="3960720" cy="4924425"/>
-          </a:xfrm>
-          <a:prstGeom prst="rect">
-            <a:avLst/>
-          </a:prstGeom>
-          <a:noFill/>
-        </p:spPr>
-        <p:txBody>
-          <a:bodyPr wrap="square" rtlCol="0">
-            <a:spAutoFit/>
-          </a:bodyPr>
-          <a:lstStyle/>
-          <a:p>
-            <a:r>
-              <a:rPr lang="en-GB" sz="5400" dirty="0" err="1">
-                <a:solidFill>
-                  <a:srgbClr val="012456"/>
-                </a:solidFill>
-                <a:latin typeface="Harlow Solid Italic" panose="04030604020F02020D02" pitchFamily="82" charset="0"/>
-              </a:rPr>
-              <a:t>Cláudio</a:t>
-            </a:r>
-            <a:endParaRPr lang="en-GB" sz="5400" dirty="0">
-              <a:solidFill>
-                <a:srgbClr val="012456"/>
-              </a:solidFill>
-              <a:latin typeface="Harlow Solid Italic" panose="04030604020F02020D02" pitchFamily="82" charset="0"/>
-            </a:endParaRPr>
-          </a:p>
-          <a:p>
-            <a:endParaRPr lang="en-GB" sz="3200" dirty="0">
-              <a:solidFill>
-                <a:srgbClr val="012456"/>
-              </a:solidFill>
-            </a:endParaRPr>
-          </a:p>
-          <a:p>
-            <a:endParaRPr lang="en-GB" sz="3200" dirty="0">
-              <a:solidFill>
-                <a:srgbClr val="012456"/>
-              </a:solidFill>
-            </a:endParaRPr>
-          </a:p>
-          <a:p>
-            <a:endParaRPr lang="en-GB" sz="3200" dirty="0">
-              <a:solidFill>
-                <a:srgbClr val="012456"/>
-              </a:solidFill>
-            </a:endParaRPr>
-          </a:p>
-          <a:p>
-            <a:endParaRPr lang="en-GB" sz="3200" dirty="0">
-              <a:solidFill>
-                <a:srgbClr val="012456"/>
-              </a:solidFill>
-            </a:endParaRPr>
-          </a:p>
-          <a:p>
-            <a:endParaRPr lang="en-GB" sz="3200" dirty="0">
-              <a:solidFill>
-                <a:srgbClr val="012456"/>
-              </a:solidFill>
-            </a:endParaRPr>
-          </a:p>
-          <a:p>
-            <a:endParaRPr lang="en-GB" sz="3200" dirty="0">
-              <a:solidFill>
-                <a:srgbClr val="012456"/>
-              </a:solidFill>
-            </a:endParaRPr>
-          </a:p>
-          <a:p>
-            <a:endParaRPr lang="en-GB" dirty="0">
-              <a:solidFill>
-                <a:srgbClr val="012456"/>
-              </a:solidFill>
-            </a:endParaRPr>
-          </a:p>
-          <a:p>
-            <a:r>
-              <a:rPr lang="en-GB" dirty="0">
-                <a:solidFill>
-                  <a:srgbClr val="012456"/>
-                </a:solidFill>
-              </a:rPr>
-              <a:t>How to Contact </a:t>
-            </a:r>
-            <a:r>
-              <a:rPr lang="en-GB" dirty="0" err="1">
-                <a:solidFill>
-                  <a:srgbClr val="012456"/>
-                </a:solidFill>
-              </a:rPr>
-              <a:t>Cláudio</a:t>
-            </a:r>
-            <a:endParaRPr lang="en-GB" dirty="0">
-              <a:solidFill>
-                <a:srgbClr val="012456"/>
-              </a:solidFill>
-            </a:endParaRPr>
-          </a:p>
-          <a:p>
-            <a:endParaRPr lang="en-GB" sz="3200" dirty="0">
-              <a:solidFill>
-                <a:srgbClr val="012456"/>
-              </a:solidFill>
-            </a:endParaRPr>
-          </a:p>
-        </p:txBody>
-      </p:sp>
-      <p:pic>
-        <p:nvPicPr>
-          <p:cNvPr id="8" name="Picture 7" descr="A person wearing a uniform&#10;&#10;Description generated with high confidence"/>
-          <p:cNvPicPr>
-            <a:picLocks noChangeAspect="1"/>
-          </p:cNvPicPr>
-          <p:nvPr/>
-        </p:nvPicPr>
-        <p:blipFill>
-          <a:blip r:embed="rId6">
-            <a:extLst>
-              <a:ext uri="{28A0092B-C50C-407E-A947-70E740481C1C}">
-                <a14:useLocalDpi xmlns:a14="http://schemas.microsoft.com/office/drawing/2010/main" val="0"/>
-              </a:ext>
-            </a:extLst>
-          </a:blip>
-          <a:stretch>
-            <a:fillRect/>
-          </a:stretch>
-        </p:blipFill>
-        <p:spPr>
-          <a:xfrm>
-            <a:off x="8652352" y="1724979"/>
-            <a:ext cx="2873444" cy="2922647"/>
+            <a:off x="8458199" y="1597494"/>
+            <a:ext cx="2763053" cy="2810365"/>
           </a:xfrm>
           <a:prstGeom prst="rect">
             <a:avLst/>
@@ -7564,7 +7340,7 @@
           <p:nvPr/>
         </p:nvPicPr>
         <p:blipFill>
-          <a:blip r:embed="rId7">
+          <a:blip r:embed="rId6">
             <a:extLst>
               <a:ext uri="{28A0092B-C50C-407E-A947-70E740481C1C}">
                 <a14:useLocalDpi xmlns:a14="http://schemas.microsoft.com/office/drawing/2010/main" val="0"/>
@@ -7585,6 +7361,697 @@
           </a:prstGeom>
         </p:spPr>
       </p:pic>
+      <p:grpSp>
+        <p:nvGrpSpPr>
+          <p:cNvPr id="11" name="Group 10"/>
+          <p:cNvGrpSpPr/>
+          <p:nvPr/>
+        </p:nvGrpSpPr>
+        <p:grpSpPr>
+          <a:xfrm>
+            <a:off x="8633007" y="4614460"/>
+            <a:ext cx="1820419" cy="485775"/>
+            <a:chOff x="104209" y="5480224"/>
+            <a:chExt cx="1856583" cy="485775"/>
+          </a:xfrm>
+        </p:grpSpPr>
+        <p:pic>
+          <p:nvPicPr>
+            <p:cNvPr id="13" name="Picture 3" descr="twitter.png"/>
+            <p:cNvPicPr>
+              <a:picLocks noChangeAspect="1"/>
+            </p:cNvPicPr>
+            <p:nvPr/>
+          </p:nvPicPr>
+          <p:blipFill>
+            <a:blip r:embed="rId7" cstate="print">
+              <a:extLst>
+                <a:ext uri="{28A0092B-C50C-407E-A947-70E740481C1C}">
+                  <a14:useLocalDpi xmlns:a14="http://schemas.microsoft.com/office/drawing/2010/main" val="0"/>
+                </a:ext>
+              </a:extLst>
+            </a:blip>
+            <a:srcRect/>
+            <a:stretch>
+              <a:fillRect/>
+            </a:stretch>
+          </p:blipFill>
+          <p:spPr bwMode="auto">
+            <a:xfrm>
+              <a:off x="104209" y="5480224"/>
+              <a:ext cx="485775" cy="485775"/>
+            </a:xfrm>
+            <a:prstGeom prst="rect">
+              <a:avLst/>
+            </a:prstGeom>
+            <a:noFill/>
+            <a:ln>
+              <a:noFill/>
+            </a:ln>
+            <a:extLst>
+              <a:ext uri="{909E8E84-426E-40dd-AFC4-6F175D3DCCD1}">
+                <a14:hiddenFill xmlns="" xmlns:a14="http://schemas.microsoft.com/office/drawing/2010/main">
+                  <a:solidFill>
+                    <a:srgbClr val="FFFFFF"/>
+                  </a:solidFill>
+                </a14:hiddenFill>
+              </a:ext>
+              <a:ext uri="{91240B29-F687-4f45-9708-019B960494DF}">
+                <a14:hiddenLine xmlns="" xmlns:a14="http://schemas.microsoft.com/office/drawing/2010/main" w="9525">
+                  <a:solidFill>
+                    <a:srgbClr val="000000"/>
+                  </a:solidFill>
+                  <a:miter lim="800000"/>
+                  <a:headEnd/>
+                  <a:tailEnd/>
+                </a14:hiddenLine>
+              </a:ext>
+            </a:extLst>
+          </p:spPr>
+        </p:pic>
+        <p:sp>
+          <p:nvSpPr>
+            <p:cNvPr id="14" name="Rectangle 6"/>
+            <p:cNvSpPr>
+              <a:spLocks noChangeArrowheads="1"/>
+            </p:cNvSpPr>
+            <p:nvPr/>
+          </p:nvSpPr>
+          <p:spPr bwMode="auto">
+            <a:xfrm>
+              <a:off x="104209" y="5556912"/>
+              <a:ext cx="1856583" cy="332399"/>
+            </a:xfrm>
+            <a:prstGeom prst="rect">
+              <a:avLst/>
+            </a:prstGeom>
+            <a:noFill/>
+            <a:ln>
+              <a:noFill/>
+            </a:ln>
+            <a:extLst>
+              <a:ext uri="{909E8E84-426E-40dd-AFC4-6F175D3DCCD1}">
+                <a14:hiddenFill xmlns="" xmlns:a14="http://schemas.microsoft.com/office/drawing/2010/main">
+                  <a:solidFill>
+                    <a:srgbClr val="FFFFFF"/>
+                  </a:solidFill>
+                </a14:hiddenFill>
+              </a:ext>
+              <a:ext uri="{91240B29-F687-4f45-9708-019B960494DF}">
+                <a14:hiddenLine xmlns="" xmlns:a14="http://schemas.microsoft.com/office/drawing/2010/main" w="9525">
+                  <a:solidFill>
+                    <a:srgbClr val="000000"/>
+                  </a:solidFill>
+                  <a:miter lim="800000"/>
+                  <a:headEnd/>
+                  <a:tailEnd/>
+                </a14:hiddenLine>
+              </a:ext>
+            </a:extLst>
+          </p:spPr>
+          <p:txBody>
+            <a:bodyPr wrap="square">
+              <a:spAutoFit/>
+            </a:bodyPr>
+            <a:lstStyle/>
+            <a:p>
+              <a:pPr lvl="1">
+                <a:lnSpc>
+                  <a:spcPct val="120000"/>
+                </a:lnSpc>
+                <a:spcBef>
+                  <a:spcPts val="1500"/>
+                </a:spcBef>
+              </a:pPr>
+              <a:r>
+                <a:rPr lang="en-CA" sz="1300" dirty="0">
+                  <a:cs typeface="Proxima Nova Light" charset="0"/>
+                </a:rPr>
+                <a:t>@claudioessilva</a:t>
+              </a:r>
+            </a:p>
+          </p:txBody>
+        </p:sp>
+      </p:grpSp>
+      <p:grpSp>
+        <p:nvGrpSpPr>
+          <p:cNvPr id="18" name="Group 17"/>
+          <p:cNvGrpSpPr/>
+          <p:nvPr/>
+        </p:nvGrpSpPr>
+        <p:grpSpPr>
+          <a:xfrm>
+            <a:off x="8633007" y="5758450"/>
+            <a:ext cx="2233114" cy="501050"/>
+            <a:chOff x="6646631" y="5472586"/>
+            <a:chExt cx="2277476" cy="501050"/>
+          </a:xfrm>
+        </p:grpSpPr>
+        <p:pic>
+          <p:nvPicPr>
+            <p:cNvPr id="19" name="Picture 18"/>
+            <p:cNvPicPr>
+              <a:picLocks noChangeAspect="1"/>
+            </p:cNvPicPr>
+            <p:nvPr/>
+          </p:nvPicPr>
+          <p:blipFill>
+            <a:blip r:embed="rId8"/>
+            <a:stretch>
+              <a:fillRect/>
+            </a:stretch>
+          </p:blipFill>
+          <p:spPr>
+            <a:xfrm>
+              <a:off x="6646631" y="5472586"/>
+              <a:ext cx="501050" cy="501050"/>
+            </a:xfrm>
+            <a:prstGeom prst="rect">
+              <a:avLst/>
+            </a:prstGeom>
+          </p:spPr>
+        </p:pic>
+        <p:sp>
+          <p:nvSpPr>
+            <p:cNvPr id="20" name="TextBox 19"/>
+            <p:cNvSpPr txBox="1"/>
+            <p:nvPr/>
+          </p:nvSpPr>
+          <p:spPr>
+            <a:xfrm>
+              <a:off x="6646632" y="5576917"/>
+              <a:ext cx="2277475" cy="292388"/>
+            </a:xfrm>
+            <a:prstGeom prst="rect">
+              <a:avLst/>
+            </a:prstGeom>
+            <a:noFill/>
+          </p:spPr>
+          <p:txBody>
+            <a:bodyPr wrap="square" rtlCol="0">
+              <a:spAutoFit/>
+            </a:bodyPr>
+            <a:lstStyle/>
+            <a:p>
+              <a:pPr lvl="1"/>
+              <a:r>
+                <a:rPr lang="en-US" sz="1300" dirty="0"/>
+                <a:t>redglue.eu/blog</a:t>
+              </a:r>
+            </a:p>
+          </p:txBody>
+        </p:sp>
+      </p:grpSp>
+      <p:grpSp>
+        <p:nvGrpSpPr>
+          <p:cNvPr id="21" name="Group 20"/>
+          <p:cNvGrpSpPr/>
+          <p:nvPr/>
+        </p:nvGrpSpPr>
+        <p:grpSpPr>
+          <a:xfrm>
+            <a:off x="8633007" y="5183947"/>
+            <a:ext cx="1716980" cy="485775"/>
+            <a:chOff x="1980403" y="5480224"/>
+            <a:chExt cx="1751089" cy="485775"/>
+          </a:xfrm>
+        </p:grpSpPr>
+        <p:sp>
+          <p:nvSpPr>
+            <p:cNvPr id="22" name="Rectangle 12"/>
+            <p:cNvSpPr>
+              <a:spLocks noChangeArrowheads="1"/>
+            </p:cNvSpPr>
+            <p:nvPr/>
+          </p:nvSpPr>
+          <p:spPr bwMode="auto">
+            <a:xfrm>
+              <a:off x="1999454" y="5567941"/>
+              <a:ext cx="1732038" cy="332399"/>
+            </a:xfrm>
+            <a:prstGeom prst="rect">
+              <a:avLst/>
+            </a:prstGeom>
+            <a:noFill/>
+            <a:ln>
+              <a:noFill/>
+            </a:ln>
+            <a:extLst>
+              <a:ext uri="{909E8E84-426E-40dd-AFC4-6F175D3DCCD1}">
+                <a14:hiddenFill xmlns="" xmlns:a14="http://schemas.microsoft.com/office/drawing/2010/main">
+                  <a:solidFill>
+                    <a:srgbClr val="FFFFFF"/>
+                  </a:solidFill>
+                </a14:hiddenFill>
+              </a:ext>
+              <a:ext uri="{91240B29-F687-4f45-9708-019B960494DF}">
+                <a14:hiddenLine xmlns="" xmlns:a14="http://schemas.microsoft.com/office/drawing/2010/main" w="9525">
+                  <a:solidFill>
+                    <a:srgbClr val="000000"/>
+                  </a:solidFill>
+                  <a:miter lim="800000"/>
+                  <a:headEnd/>
+                  <a:tailEnd/>
+                </a14:hiddenLine>
+              </a:ext>
+            </a:extLst>
+          </p:spPr>
+          <p:txBody>
+            <a:bodyPr wrap="square">
+              <a:spAutoFit/>
+            </a:bodyPr>
+            <a:lstStyle/>
+            <a:p>
+              <a:pPr lvl="1">
+                <a:lnSpc>
+                  <a:spcPct val="120000"/>
+                </a:lnSpc>
+                <a:spcBef>
+                  <a:spcPts val="1500"/>
+                </a:spcBef>
+              </a:pPr>
+              <a:r>
+                <a:rPr lang="en-CA" sz="1300" dirty="0">
+                  <a:cs typeface="Proxima Nova Light" charset="0"/>
+                </a:rPr>
+                <a:t>claudioessilva</a:t>
+              </a:r>
+            </a:p>
+          </p:txBody>
+        </p:sp>
+        <p:pic>
+          <p:nvPicPr>
+            <p:cNvPr id="23" name="Picture 22" descr="linkedin.png"/>
+            <p:cNvPicPr>
+              <a:picLocks noChangeAspect="1"/>
+            </p:cNvPicPr>
+            <p:nvPr/>
+          </p:nvPicPr>
+          <p:blipFill>
+            <a:blip r:embed="rId9" cstate="print">
+              <a:extLst>
+                <a:ext uri="{28A0092B-C50C-407E-A947-70E740481C1C}">
+                  <a14:useLocalDpi xmlns:a14="http://schemas.microsoft.com/office/drawing/2010/main" val="0"/>
+                </a:ext>
+              </a:extLst>
+            </a:blip>
+            <a:srcRect/>
+            <a:stretch>
+              <a:fillRect/>
+            </a:stretch>
+          </p:blipFill>
+          <p:spPr bwMode="auto">
+            <a:xfrm>
+              <a:off x="1980403" y="5480224"/>
+              <a:ext cx="485775" cy="485775"/>
+            </a:xfrm>
+            <a:prstGeom prst="rect">
+              <a:avLst/>
+            </a:prstGeom>
+            <a:noFill/>
+            <a:ln>
+              <a:noFill/>
+            </a:ln>
+            <a:extLst>
+              <a:ext uri="{909E8E84-426E-40dd-AFC4-6F175D3DCCD1}">
+                <a14:hiddenFill xmlns="" xmlns:a14="http://schemas.microsoft.com/office/drawing/2010/main">
+                  <a:solidFill>
+                    <a:srgbClr val="FFFFFF"/>
+                  </a:solidFill>
+                </a14:hiddenFill>
+              </a:ext>
+              <a:ext uri="{91240B29-F687-4f45-9708-019B960494DF}">
+                <a14:hiddenLine xmlns="" xmlns:a14="http://schemas.microsoft.com/office/drawing/2010/main" w="9525">
+                  <a:solidFill>
+                    <a:srgbClr val="000000"/>
+                  </a:solidFill>
+                  <a:miter lim="800000"/>
+                  <a:headEnd/>
+                  <a:tailEnd/>
+                </a14:hiddenLine>
+              </a:ext>
+            </a:extLst>
+          </p:spPr>
+        </p:pic>
+      </p:grpSp>
+      <p:grpSp>
+        <p:nvGrpSpPr>
+          <p:cNvPr id="43" name="Group 42"/>
+          <p:cNvGrpSpPr/>
+          <p:nvPr/>
+        </p:nvGrpSpPr>
+        <p:grpSpPr>
+          <a:xfrm>
+            <a:off x="975835" y="4614460"/>
+            <a:ext cx="1971486" cy="485775"/>
+            <a:chOff x="104209" y="5480224"/>
+            <a:chExt cx="2010651" cy="485775"/>
+          </a:xfrm>
+        </p:grpSpPr>
+        <p:pic>
+          <p:nvPicPr>
+            <p:cNvPr id="44" name="Picture 3" descr="twitter.png"/>
+            <p:cNvPicPr>
+              <a:picLocks noChangeAspect="1"/>
+            </p:cNvPicPr>
+            <p:nvPr/>
+          </p:nvPicPr>
+          <p:blipFill>
+            <a:blip r:embed="rId7" cstate="print">
+              <a:extLst>
+                <a:ext uri="{28A0092B-C50C-407E-A947-70E740481C1C}">
+                  <a14:useLocalDpi xmlns:a14="http://schemas.microsoft.com/office/drawing/2010/main" val="0"/>
+                </a:ext>
+              </a:extLst>
+            </a:blip>
+            <a:srcRect/>
+            <a:stretch>
+              <a:fillRect/>
+            </a:stretch>
+          </p:blipFill>
+          <p:spPr bwMode="auto">
+            <a:xfrm>
+              <a:off x="104209" y="5480224"/>
+              <a:ext cx="485775" cy="485775"/>
+            </a:xfrm>
+            <a:prstGeom prst="rect">
+              <a:avLst/>
+            </a:prstGeom>
+            <a:noFill/>
+            <a:ln>
+              <a:noFill/>
+            </a:ln>
+            <a:extLst>
+              <a:ext uri="{909E8E84-426E-40dd-AFC4-6F175D3DCCD1}">
+                <a14:hiddenFill xmlns="" xmlns:a14="http://schemas.microsoft.com/office/drawing/2010/main">
+                  <a:solidFill>
+                    <a:srgbClr val="FFFFFF"/>
+                  </a:solidFill>
+                </a14:hiddenFill>
+              </a:ext>
+              <a:ext uri="{91240B29-F687-4f45-9708-019B960494DF}">
+                <a14:hiddenLine xmlns="" xmlns:a14="http://schemas.microsoft.com/office/drawing/2010/main" w="9525">
+                  <a:solidFill>
+                    <a:srgbClr val="000000"/>
+                  </a:solidFill>
+                  <a:miter lim="800000"/>
+                  <a:headEnd/>
+                  <a:tailEnd/>
+                </a14:hiddenLine>
+              </a:ext>
+            </a:extLst>
+          </p:spPr>
+        </p:pic>
+        <p:sp>
+          <p:nvSpPr>
+            <p:cNvPr id="45" name="Rectangle 6"/>
+            <p:cNvSpPr>
+              <a:spLocks noChangeArrowheads="1"/>
+            </p:cNvSpPr>
+            <p:nvPr/>
+          </p:nvSpPr>
+          <p:spPr bwMode="auto">
+            <a:xfrm>
+              <a:off x="104209" y="5556912"/>
+              <a:ext cx="2010651" cy="332399"/>
+            </a:xfrm>
+            <a:prstGeom prst="rect">
+              <a:avLst/>
+            </a:prstGeom>
+            <a:noFill/>
+            <a:ln>
+              <a:noFill/>
+            </a:ln>
+            <a:extLst>
+              <a:ext uri="{909E8E84-426E-40dd-AFC4-6F175D3DCCD1}">
+                <a14:hiddenFill xmlns="" xmlns:a14="http://schemas.microsoft.com/office/drawing/2010/main">
+                  <a:solidFill>
+                    <a:srgbClr val="FFFFFF"/>
+                  </a:solidFill>
+                </a14:hiddenFill>
+              </a:ext>
+              <a:ext uri="{91240B29-F687-4f45-9708-019B960494DF}">
+                <a14:hiddenLine xmlns="" xmlns:a14="http://schemas.microsoft.com/office/drawing/2010/main" w="9525">
+                  <a:solidFill>
+                    <a:srgbClr val="000000"/>
+                  </a:solidFill>
+                  <a:miter lim="800000"/>
+                  <a:headEnd/>
+                  <a:tailEnd/>
+                </a14:hiddenLine>
+              </a:ext>
+            </a:extLst>
+          </p:spPr>
+          <p:txBody>
+            <a:bodyPr wrap="square">
+              <a:spAutoFit/>
+            </a:bodyPr>
+            <a:lstStyle/>
+            <a:p>
+              <a:pPr lvl="1">
+                <a:lnSpc>
+                  <a:spcPct val="120000"/>
+                </a:lnSpc>
+                <a:spcBef>
+                  <a:spcPts val="1500"/>
+                </a:spcBef>
+              </a:pPr>
+              <a:r>
+                <a:rPr lang="en-GB" sz="1300" dirty="0"/>
+                <a:t>@</a:t>
+              </a:r>
+              <a:r>
+                <a:rPr lang="en-GB" sz="1300" dirty="0" err="1"/>
+                <a:t>sqldbawithbeard</a:t>
+              </a:r>
+              <a:endParaRPr lang="en-GB" sz="1300" dirty="0"/>
+            </a:p>
+          </p:txBody>
+        </p:sp>
+      </p:grpSp>
+      <p:grpSp>
+        <p:nvGrpSpPr>
+          <p:cNvPr id="49" name="Group 48"/>
+          <p:cNvGrpSpPr/>
+          <p:nvPr/>
+        </p:nvGrpSpPr>
+        <p:grpSpPr>
+          <a:xfrm>
+            <a:off x="975835" y="5183947"/>
+            <a:ext cx="1921144" cy="485775"/>
+            <a:chOff x="1980403" y="5480224"/>
+            <a:chExt cx="1959309" cy="485775"/>
+          </a:xfrm>
+        </p:grpSpPr>
+        <p:sp>
+          <p:nvSpPr>
+            <p:cNvPr id="50" name="Rectangle 12"/>
+            <p:cNvSpPr>
+              <a:spLocks noChangeArrowheads="1"/>
+            </p:cNvSpPr>
+            <p:nvPr/>
+          </p:nvSpPr>
+          <p:spPr bwMode="auto">
+            <a:xfrm>
+              <a:off x="1999453" y="5567941"/>
+              <a:ext cx="1940259" cy="316369"/>
+            </a:xfrm>
+            <a:prstGeom prst="rect">
+              <a:avLst/>
+            </a:prstGeom>
+            <a:noFill/>
+            <a:ln>
+              <a:noFill/>
+            </a:ln>
+            <a:extLst>
+              <a:ext uri="{909E8E84-426E-40dd-AFC4-6F175D3DCCD1}">
+                <a14:hiddenFill xmlns="" xmlns:a14="http://schemas.microsoft.com/office/drawing/2010/main">
+                  <a:solidFill>
+                    <a:srgbClr val="FFFFFF"/>
+                  </a:solidFill>
+                </a14:hiddenFill>
+              </a:ext>
+              <a:ext uri="{91240B29-F687-4f45-9708-019B960494DF}">
+                <a14:hiddenLine xmlns="" xmlns:a14="http://schemas.microsoft.com/office/drawing/2010/main" w="9525">
+                  <a:solidFill>
+                    <a:srgbClr val="000000"/>
+                  </a:solidFill>
+                  <a:miter lim="800000"/>
+                  <a:headEnd/>
+                  <a:tailEnd/>
+                </a14:hiddenLine>
+              </a:ext>
+            </a:extLst>
+          </p:spPr>
+          <p:txBody>
+            <a:bodyPr wrap="square">
+              <a:spAutoFit/>
+            </a:bodyPr>
+            <a:lstStyle/>
+            <a:p>
+              <a:pPr lvl="1">
+                <a:lnSpc>
+                  <a:spcPct val="120000"/>
+                </a:lnSpc>
+                <a:spcBef>
+                  <a:spcPts val="1500"/>
+                </a:spcBef>
+              </a:pPr>
+              <a:r>
+                <a:rPr lang="en-GB" sz="1300" u="sng" dirty="0" err="1"/>
+                <a:t>robsewellsqldba</a:t>
+              </a:r>
+              <a:endParaRPr lang="en-CA" sz="1300" dirty="0">
+                <a:cs typeface="Proxima Nova Light" charset="0"/>
+              </a:endParaRPr>
+            </a:p>
+          </p:txBody>
+        </p:sp>
+        <p:pic>
+          <p:nvPicPr>
+            <p:cNvPr id="51" name="Picture 50" descr="linkedin.png"/>
+            <p:cNvPicPr>
+              <a:picLocks noChangeAspect="1"/>
+            </p:cNvPicPr>
+            <p:nvPr/>
+          </p:nvPicPr>
+          <p:blipFill>
+            <a:blip r:embed="rId9" cstate="print">
+              <a:extLst>
+                <a:ext uri="{28A0092B-C50C-407E-A947-70E740481C1C}">
+                  <a14:useLocalDpi xmlns:a14="http://schemas.microsoft.com/office/drawing/2010/main" val="0"/>
+                </a:ext>
+              </a:extLst>
+            </a:blip>
+            <a:srcRect/>
+            <a:stretch>
+              <a:fillRect/>
+            </a:stretch>
+          </p:blipFill>
+          <p:spPr bwMode="auto">
+            <a:xfrm>
+              <a:off x="1980403" y="5480224"/>
+              <a:ext cx="485775" cy="485775"/>
+            </a:xfrm>
+            <a:prstGeom prst="rect">
+              <a:avLst/>
+            </a:prstGeom>
+            <a:noFill/>
+            <a:ln>
+              <a:noFill/>
+            </a:ln>
+            <a:extLst>
+              <a:ext uri="{909E8E84-426E-40dd-AFC4-6F175D3DCCD1}">
+                <a14:hiddenFill xmlns="" xmlns:a14="http://schemas.microsoft.com/office/drawing/2010/main">
+                  <a:solidFill>
+                    <a:srgbClr val="FFFFFF"/>
+                  </a:solidFill>
+                </a14:hiddenFill>
+              </a:ext>
+              <a:ext uri="{91240B29-F687-4f45-9708-019B960494DF}">
+                <a14:hiddenLine xmlns="" xmlns:a14="http://schemas.microsoft.com/office/drawing/2010/main" w="9525">
+                  <a:solidFill>
+                    <a:srgbClr val="000000"/>
+                  </a:solidFill>
+                  <a:miter lim="800000"/>
+                  <a:headEnd/>
+                  <a:tailEnd/>
+                </a14:hiddenLine>
+              </a:ext>
+            </a:extLst>
+          </p:spPr>
+        </p:pic>
+      </p:grpSp>
+      <p:grpSp>
+        <p:nvGrpSpPr>
+          <p:cNvPr id="61" name="Group 60"/>
+          <p:cNvGrpSpPr/>
+          <p:nvPr/>
+        </p:nvGrpSpPr>
+        <p:grpSpPr>
+          <a:xfrm>
+            <a:off x="975835" y="5757419"/>
+            <a:ext cx="2233114" cy="501050"/>
+            <a:chOff x="6646631" y="5472586"/>
+            <a:chExt cx="2277476" cy="501050"/>
+          </a:xfrm>
+        </p:grpSpPr>
+        <p:pic>
+          <p:nvPicPr>
+            <p:cNvPr id="62" name="Picture 61"/>
+            <p:cNvPicPr>
+              <a:picLocks noChangeAspect="1"/>
+            </p:cNvPicPr>
+            <p:nvPr/>
+          </p:nvPicPr>
+          <p:blipFill>
+            <a:blip r:embed="rId8"/>
+            <a:stretch>
+              <a:fillRect/>
+            </a:stretch>
+          </p:blipFill>
+          <p:spPr>
+            <a:xfrm>
+              <a:off x="6646631" y="5472586"/>
+              <a:ext cx="501050" cy="501050"/>
+            </a:xfrm>
+            <a:prstGeom prst="rect">
+              <a:avLst/>
+            </a:prstGeom>
+          </p:spPr>
+        </p:pic>
+        <p:sp>
+          <p:nvSpPr>
+            <p:cNvPr id="63" name="TextBox 62"/>
+            <p:cNvSpPr txBox="1"/>
+            <p:nvPr/>
+          </p:nvSpPr>
+          <p:spPr>
+            <a:xfrm>
+              <a:off x="6646632" y="5576917"/>
+              <a:ext cx="2277475" cy="276999"/>
+            </a:xfrm>
+            <a:prstGeom prst="rect">
+              <a:avLst/>
+            </a:prstGeom>
+            <a:noFill/>
+          </p:spPr>
+          <p:txBody>
+            <a:bodyPr wrap="square" rtlCol="0">
+              <a:spAutoFit/>
+            </a:bodyPr>
+            <a:lstStyle/>
+            <a:p>
+              <a:pPr lvl="1"/>
+              <a:r>
+                <a:rPr lang="en-GB" sz="1200" dirty="0">
+                  <a:solidFill>
+                    <a:srgbClr val="012456"/>
+                  </a:solidFill>
+                </a:rPr>
+                <a:t>sqldbawith</a:t>
+              </a:r>
+              <a:r>
+                <a:rPr lang="en-GB" sz="1200" dirty="0">
+                  <a:solidFill>
+                    <a:srgbClr val="FF0000"/>
+                  </a:solidFill>
+                </a:rPr>
+                <a:t>A</a:t>
+              </a:r>
+              <a:r>
+                <a:rPr lang="en-GB" sz="1200" dirty="0">
+                  <a:solidFill>
+                    <a:srgbClr val="012456"/>
+                  </a:solidFill>
+                </a:rPr>
+                <a:t>beard.com</a:t>
+              </a:r>
+              <a:endParaRPr lang="en-US" sz="1200" dirty="0"/>
+            </a:p>
+          </p:txBody>
+        </p:sp>
+      </p:grpSp>
     </p:spTree>
     <p:extLst>
       <p:ext uri="{BB962C8B-B14F-4D97-AF65-F5344CB8AC3E}">
@@ -7596,6 +8063,234 @@
     <a:masterClrMapping/>
   </p:clrMapOvr>
   <p:transition spd="slow"/>
+  <p:timing>
+    <p:tnLst>
+      <p:par>
+        <p:cTn id="1" dur="indefinite" restart="never" nodeType="tmRoot">
+          <p:childTnLst>
+            <p:seq concurrent="1" nextAc="seek">
+              <p:cTn id="2" dur="indefinite" nodeType="mainSeq">
+                <p:childTnLst>
+                  <p:par>
+                    <p:cTn id="3" fill="hold">
+                      <p:stCondLst>
+                        <p:cond delay="indefinite"/>
+                      </p:stCondLst>
+                      <p:childTnLst>
+                        <p:par>
+                          <p:cTn id="4" fill="hold">
+                            <p:stCondLst>
+                              <p:cond delay="0"/>
+                            </p:stCondLst>
+                            <p:childTnLst>
+                              <p:par>
+                                <p:cTn id="5" presetID="1" presetClass="entr" presetSubtype="0" fill="hold" nodeType="clickEffect">
+                                  <p:stCondLst>
+                                    <p:cond delay="0"/>
+                                  </p:stCondLst>
+                                  <p:childTnLst>
+                                    <p:set>
+                                      <p:cBhvr>
+                                        <p:cTn id="6" dur="1" fill="hold">
+                                          <p:stCondLst>
+                                            <p:cond delay="0"/>
+                                          </p:stCondLst>
+                                        </p:cTn>
+                                        <p:tgtEl>
+                                          <p:spTgt spid="11"/>
+                                        </p:tgtEl>
+                                        <p:attrNameLst>
+                                          <p:attrName>style.visibility</p:attrName>
+                                        </p:attrNameLst>
+                                      </p:cBhvr>
+                                      <p:to>
+                                        <p:strVal val="visible"/>
+                                      </p:to>
+                                    </p:set>
+                                  </p:childTnLst>
+                                </p:cTn>
+                              </p:par>
+                              <p:par>
+                                <p:cTn id="7" presetID="1" presetClass="entr" presetSubtype="0" fill="hold" nodeType="withEffect">
+                                  <p:stCondLst>
+                                    <p:cond delay="0"/>
+                                  </p:stCondLst>
+                                  <p:childTnLst>
+                                    <p:set>
+                                      <p:cBhvr>
+                                        <p:cTn id="8" dur="1" fill="hold">
+                                          <p:stCondLst>
+                                            <p:cond delay="0"/>
+                                          </p:stCondLst>
+                                        </p:cTn>
+                                        <p:tgtEl>
+                                          <p:spTgt spid="18"/>
+                                        </p:tgtEl>
+                                        <p:attrNameLst>
+                                          <p:attrName>style.visibility</p:attrName>
+                                        </p:attrNameLst>
+                                      </p:cBhvr>
+                                      <p:to>
+                                        <p:strVal val="visible"/>
+                                      </p:to>
+                                    </p:set>
+                                  </p:childTnLst>
+                                </p:cTn>
+                              </p:par>
+                              <p:par>
+                                <p:cTn id="9" presetID="1" presetClass="entr" presetSubtype="0" fill="hold" nodeType="withEffect">
+                                  <p:stCondLst>
+                                    <p:cond delay="0"/>
+                                  </p:stCondLst>
+                                  <p:childTnLst>
+                                    <p:set>
+                                      <p:cBhvr>
+                                        <p:cTn id="10" dur="1" fill="hold">
+                                          <p:stCondLst>
+                                            <p:cond delay="0"/>
+                                          </p:stCondLst>
+                                        </p:cTn>
+                                        <p:tgtEl>
+                                          <p:spTgt spid="21"/>
+                                        </p:tgtEl>
+                                        <p:attrNameLst>
+                                          <p:attrName>style.visibility</p:attrName>
+                                        </p:attrNameLst>
+                                      </p:cBhvr>
+                                      <p:to>
+                                        <p:strVal val="visible"/>
+                                      </p:to>
+                                    </p:set>
+                                  </p:childTnLst>
+                                </p:cTn>
+                              </p:par>
+                            </p:childTnLst>
+                          </p:cTn>
+                        </p:par>
+                      </p:childTnLst>
+                    </p:cTn>
+                  </p:par>
+                  <p:par>
+                    <p:cTn id="11" fill="hold">
+                      <p:stCondLst>
+                        <p:cond delay="indefinite"/>
+                      </p:stCondLst>
+                      <p:childTnLst>
+                        <p:par>
+                          <p:cTn id="12" fill="hold">
+                            <p:stCondLst>
+                              <p:cond delay="0"/>
+                            </p:stCondLst>
+                            <p:childTnLst>
+                              <p:par>
+                                <p:cTn id="13" presetID="1" presetClass="entr" presetSubtype="0" fill="hold" nodeType="clickEffect">
+                                  <p:stCondLst>
+                                    <p:cond delay="0"/>
+                                  </p:stCondLst>
+                                  <p:childTnLst>
+                                    <p:set>
+                                      <p:cBhvr>
+                                        <p:cTn id="14" dur="1" fill="hold">
+                                          <p:stCondLst>
+                                            <p:cond delay="0"/>
+                                          </p:stCondLst>
+                                        </p:cTn>
+                                        <p:tgtEl>
+                                          <p:spTgt spid="43"/>
+                                        </p:tgtEl>
+                                        <p:attrNameLst>
+                                          <p:attrName>style.visibility</p:attrName>
+                                        </p:attrNameLst>
+                                      </p:cBhvr>
+                                      <p:to>
+                                        <p:strVal val="visible"/>
+                                      </p:to>
+                                    </p:set>
+                                  </p:childTnLst>
+                                </p:cTn>
+                              </p:par>
+                              <p:par>
+                                <p:cTn id="15" presetID="1" presetClass="entr" presetSubtype="0" fill="hold" nodeType="withEffect">
+                                  <p:stCondLst>
+                                    <p:cond delay="0"/>
+                                  </p:stCondLst>
+                                  <p:childTnLst>
+                                    <p:set>
+                                      <p:cBhvr>
+                                        <p:cTn id="16" dur="1" fill="hold">
+                                          <p:stCondLst>
+                                            <p:cond delay="0"/>
+                                          </p:stCondLst>
+                                        </p:cTn>
+                                        <p:tgtEl>
+                                          <p:spTgt spid="49"/>
+                                        </p:tgtEl>
+                                        <p:attrNameLst>
+                                          <p:attrName>style.visibility</p:attrName>
+                                        </p:attrNameLst>
+                                      </p:cBhvr>
+                                      <p:to>
+                                        <p:strVal val="visible"/>
+                                      </p:to>
+                                    </p:set>
+                                  </p:childTnLst>
+                                </p:cTn>
+                              </p:par>
+                              <p:par>
+                                <p:cTn id="17" presetID="1" presetClass="entr" presetSubtype="0" fill="hold" nodeType="withEffect">
+                                  <p:stCondLst>
+                                    <p:cond delay="0"/>
+                                  </p:stCondLst>
+                                  <p:childTnLst>
+                                    <p:set>
+                                      <p:cBhvr>
+                                        <p:cTn id="18" dur="1" fill="hold">
+                                          <p:stCondLst>
+                                            <p:cond delay="0"/>
+                                          </p:stCondLst>
+                                        </p:cTn>
+                                        <p:tgtEl>
+                                          <p:spTgt spid="61"/>
+                                        </p:tgtEl>
+                                        <p:attrNameLst>
+                                          <p:attrName>style.visibility</p:attrName>
+                                        </p:attrNameLst>
+                                      </p:cBhvr>
+                                      <p:to>
+                                        <p:strVal val="visible"/>
+                                      </p:to>
+                                    </p:set>
+                                  </p:childTnLst>
+                                </p:cTn>
+                              </p:par>
+                            </p:childTnLst>
+                          </p:cTn>
+                        </p:par>
+                      </p:childTnLst>
+                    </p:cTn>
+                  </p:par>
+                </p:childTnLst>
+              </p:cTn>
+              <p:prevCondLst>
+                <p:cond evt="onPrev" delay="0">
+                  <p:tgtEl>
+                    <p:sldTgt/>
+                  </p:tgtEl>
+                </p:cond>
+              </p:prevCondLst>
+              <p:nextCondLst>
+                <p:cond evt="onNext" delay="0">
+                  <p:tgtEl>
+                    <p:sldTgt/>
+                  </p:tgtEl>
+                </p:cond>
+              </p:nextCondLst>
+            </p:seq>
+          </p:childTnLst>
+        </p:cTn>
+      </p:par>
+    </p:tnLst>
+  </p:timing>
 </p:sld>
 </file>
 
@@ -7685,7 +8380,7 @@
         <p:spPr>
           <a:xfrm>
             <a:off x="184030" y="95394"/>
-            <a:ext cx="11846944" cy="2308324"/>
+            <a:ext cx="11846944" cy="1015663"/>
           </a:xfrm>
           <a:prstGeom prst="rect">
             <a:avLst/>
@@ -7700,7 +8395,7 @@
           <a:p>
             <a:pPr algn="ctr"/>
             <a:r>
-              <a:rPr lang="pt-PT" sz="7200" dirty="0">
+              <a:rPr lang="pt-PT" sz="6000" dirty="0">
                 <a:solidFill>
                   <a:schemeClr val="tx1">
                     <a:lumMod val="75000"/>

</xml_diff>